<commit_message>
fixed table - still needs data
</commit_message>
<xml_diff>
--- a/project1.pptx
+++ b/project1.pptx
@@ -218,7 +218,7 @@
           <a:effectLst/>
           <a:extLst>
             <a:ext uri="{91240B29-F687-4f45-9708-019B960494DF}">
-              <a14:hiddenLine xmlns="" xmlns:a14="http://schemas.microsoft.com/office/drawing/2010/main" w="9525">
+              <a14:hiddenLine xmlns:a14="http://schemas.microsoft.com/office/drawing/2010/main" xmlns="" w="9525">
                 <a:solidFill>
                   <a:srgbClr val="000000"/>
                 </a:solidFill>
@@ -411,7 +411,7 @@
             <a:fld id="{08B9EBBA-996F-894A-B54A-D6246ED52CEA}" type="datetimeFigureOut">
               <a:rPr lang="en-US" dirty="0"/>
               <a:pPr/>
-              <a:t>2/23/2019</a:t>
+              <a:t>2/24/2019</a:t>
             </a:fld>
             <a:endParaRPr lang="en-US" dirty="0"/>
           </a:p>
@@ -726,7 +726,7 @@
             <a:fld id="{18C79C5D-2A6F-F04D-97DA-BEF2467B64E4}" type="datetimeFigureOut">
               <a:rPr lang="en-US" dirty="0"/>
               <a:pPr/>
-              <a:t>2/23/2019</a:t>
+              <a:t>2/24/2019</a:t>
             </a:fld>
             <a:endParaRPr lang="en-US" dirty="0"/>
           </a:p>
@@ -1211,7 +1211,7 @@
             <a:fld id="{8DFA1846-DA80-1C48-A609-854EA85C59AD}" type="datetimeFigureOut">
               <a:rPr lang="en-US" dirty="0"/>
               <a:pPr/>
-              <a:t>2/23/2019</a:t>
+              <a:t>2/24/2019</a:t>
             </a:fld>
             <a:endParaRPr lang="en-US" dirty="0"/>
           </a:p>
@@ -1577,7 +1577,7 @@
             <a:fld id="{FBF54567-0DE4-3F47-BF90-CB84690072F9}" type="datetimeFigureOut">
               <a:rPr lang="en-US" dirty="0"/>
               <a:pPr/>
-              <a:t>2/23/2019</a:t>
+              <a:t>2/24/2019</a:t>
             </a:fld>
             <a:endParaRPr lang="en-US" dirty="0"/>
           </a:p>
@@ -1728,7 +1728,7 @@
           <a:ln/>
           <a:extLst>
             <a:ext uri="{91240B29-F687-4f45-9708-019B960494DF}">
-              <a14:hiddenLine xmlns="" xmlns:a14="http://schemas.microsoft.com/office/drawing/2010/main" w="9525">
+              <a14:hiddenLine xmlns:a14="http://schemas.microsoft.com/office/drawing/2010/main" xmlns="" w="9525">
                 <a:solidFill>
                   <a:srgbClr val="000000"/>
                 </a:solidFill>
@@ -1847,7 +1847,7 @@
             <a:fld id="{C6C52C72-DE31-F449-A4ED-4C594FD91407}" type="datetimeFigureOut">
               <a:rPr lang="en-US" dirty="0"/>
               <a:pPr/>
-              <a:t>2/23/2019</a:t>
+              <a:t>2/24/2019</a:t>
             </a:fld>
             <a:endParaRPr lang="en-US" dirty="0"/>
           </a:p>
@@ -2000,7 +2000,7 @@
           <a:ln/>
           <a:extLst>
             <a:ext uri="{91240B29-F687-4f45-9708-019B960494DF}">
-              <a14:hiddenLine xmlns="" xmlns:a14="http://schemas.microsoft.com/office/drawing/2010/main" w="9525">
+              <a14:hiddenLine xmlns:a14="http://schemas.microsoft.com/office/drawing/2010/main" xmlns="" w="9525">
                 <a:solidFill>
                   <a:srgbClr val="000000"/>
                 </a:solidFill>
@@ -2129,7 +2129,7 @@
             <a:fld id="{ED62726E-379B-B349-9EED-81ED093FA806}" type="datetimeFigureOut">
               <a:rPr lang="en-US" dirty="0"/>
               <a:pPr/>
-              <a:t>2/23/2019</a:t>
+              <a:t>2/24/2019</a:t>
             </a:fld>
             <a:endParaRPr lang="en-US" dirty="0"/>
           </a:p>
@@ -2280,7 +2280,7 @@
           <a:ln/>
           <a:extLst>
             <a:ext uri="{91240B29-F687-4f45-9708-019B960494DF}">
-              <a14:hiddenLine xmlns="" xmlns:a14="http://schemas.microsoft.com/office/drawing/2010/main" w="9525">
+              <a14:hiddenLine xmlns:a14="http://schemas.microsoft.com/office/drawing/2010/main" xmlns="" w="9525">
                 <a:solidFill>
                   <a:srgbClr val="000000"/>
                 </a:solidFill>
@@ -2409,7 +2409,7 @@
             <a:fld id="{9B3A1323-8D79-1946-B0D7-40001CF92E9D}" type="datetimeFigureOut">
               <a:rPr lang="en-US" dirty="0"/>
               <a:pPr/>
-              <a:t>2/23/2019</a:t>
+              <a:t>2/24/2019</a:t>
             </a:fld>
             <a:endParaRPr lang="en-US" dirty="0"/>
           </a:p>
@@ -2749,7 +2749,7 @@
             <a:fld id="{8DFA1846-DA80-1C48-A609-854EA85C59AD}" type="datetimeFigureOut">
               <a:rPr lang="en-US" dirty="0"/>
               <a:pPr/>
-              <a:t>2/23/2019</a:t>
+              <a:t>2/24/2019</a:t>
             </a:fld>
             <a:endParaRPr lang="en-US" dirty="0"/>
           </a:p>
@@ -2900,7 +2900,7 @@
           <a:ln/>
           <a:extLst>
             <a:ext uri="{91240B29-F687-4f45-9708-019B960494DF}">
-              <a14:hiddenLine xmlns="" xmlns:a14="http://schemas.microsoft.com/office/drawing/2010/main" w="9525">
+              <a14:hiddenLine xmlns:a14="http://schemas.microsoft.com/office/drawing/2010/main" xmlns="" w="9525">
                 <a:solidFill>
                   <a:srgbClr val="000000"/>
                 </a:solidFill>
@@ -3085,7 +3085,7 @@
             <a:fld id="{57302355-E14B-8545-A8F8-0FE83CC9D524}" type="datetimeFigureOut">
               <a:rPr lang="en-US" dirty="0"/>
               <a:pPr/>
-              <a:t>2/23/2019</a:t>
+              <a:t>2/24/2019</a:t>
             </a:fld>
             <a:endParaRPr lang="en-US" dirty="0"/>
           </a:p>
@@ -3236,7 +3236,7 @@
           <a:ln/>
           <a:extLst>
             <a:ext uri="{91240B29-F687-4f45-9708-019B960494DF}">
-              <a14:hiddenLine xmlns="" xmlns:a14="http://schemas.microsoft.com/office/drawing/2010/main" w="9525">
+              <a14:hiddenLine xmlns:a14="http://schemas.microsoft.com/office/drawing/2010/main" xmlns="" w="9525">
                 <a:solidFill>
                   <a:srgbClr val="000000"/>
                 </a:solidFill>
@@ -3559,7 +3559,7 @@
             <a:fld id="{02640F58-564D-2B4F-AE67-E407BA4FCF45}" type="datetimeFigureOut">
               <a:rPr lang="en-US" dirty="0"/>
               <a:pPr/>
-              <a:t>2/23/2019</a:t>
+              <a:t>2/24/2019</a:t>
             </a:fld>
             <a:endParaRPr lang="en-US" dirty="0"/>
           </a:p>
@@ -3710,7 +3710,7 @@
           <a:ln/>
           <a:extLst>
             <a:ext uri="{91240B29-F687-4f45-9708-019B960494DF}">
-              <a14:hiddenLine xmlns="" xmlns:a14="http://schemas.microsoft.com/office/drawing/2010/main" w="9525">
+              <a14:hiddenLine xmlns:a14="http://schemas.microsoft.com/office/drawing/2010/main" xmlns="" w="9525">
                 <a:solidFill>
                   <a:srgbClr val="000000"/>
                 </a:solidFill>
@@ -3777,7 +3777,7 @@
             <a:fld id="{F13A34C8-038E-2045-AF43-DF7DBB8E0E9E}" type="datetimeFigureOut">
               <a:rPr lang="en-US" dirty="0"/>
               <a:pPr/>
-              <a:t>2/23/2019</a:t>
+              <a:t>2/24/2019</a:t>
             </a:fld>
             <a:endParaRPr lang="en-US" dirty="0"/>
           </a:p>
@@ -3869,7 +3869,7 @@
             <a:fld id="{8818C68F-D26B-8F47-958C-23B49CF8A634}" type="datetimeFigureOut">
               <a:rPr lang="en-US" dirty="0"/>
               <a:pPr/>
-              <a:t>2/23/2019</a:t>
+              <a:t>2/24/2019</a:t>
             </a:fld>
             <a:endParaRPr lang="en-US" dirty="0"/>
           </a:p>
@@ -4133,7 +4133,7 @@
           <a:ln/>
           <a:extLst>
             <a:ext uri="{91240B29-F687-4f45-9708-019B960494DF}">
-              <a14:hiddenLine xmlns="" xmlns:a14="http://schemas.microsoft.com/office/drawing/2010/main" w="9525">
+              <a14:hiddenLine xmlns:a14="http://schemas.microsoft.com/office/drawing/2010/main" xmlns="" w="9525">
                 <a:solidFill>
                   <a:srgbClr val="000000"/>
                 </a:solidFill>
@@ -4333,7 +4333,7 @@
             <a:fld id="{D0DF5E60-9974-AC48-9591-99C2BB44B7CF}" type="datetimeFigureOut">
               <a:rPr lang="en-US" dirty="0"/>
               <a:pPr/>
-              <a:t>2/23/2019</a:t>
+              <a:t>2/24/2019</a:t>
             </a:fld>
             <a:endParaRPr lang="en-US" dirty="0"/>
           </a:p>
@@ -4643,7 +4643,7 @@
             <a:fld id="{18C79C5D-2A6F-F04D-97DA-BEF2467B64E4}" type="datetimeFigureOut">
               <a:rPr lang="en-US" dirty="0"/>
               <a:pPr/>
-              <a:t>2/23/2019</a:t>
+              <a:t>2/24/2019</a:t>
             </a:fld>
             <a:endParaRPr lang="en-US" dirty="0"/>
           </a:p>
@@ -4910,7 +4910,7 @@
             <a:fld id="{09B482E8-6E0E-1B4F-B1FD-C69DB9E858D9}" type="datetimeFigureOut">
               <a:rPr lang="en-US" dirty="0"/>
               <a:pPr/>
-              <a:t>2/23/2019</a:t>
+              <a:t>2/24/2019</a:t>
             </a:fld>
             <a:endParaRPr lang="en-US" dirty="0"/>
           </a:p>
@@ -5862,14 +5862,14 @@
           <p:nvPr>
             <p:extLst>
               <p:ext uri="{D42A27DB-BD31-4B8C-83A1-F6EECF244321}">
-                <p14:modId xmlns:p14="http://schemas.microsoft.com/office/powerpoint/2010/main" val="583221275"/>
+                <p14:modId xmlns:p14="http://schemas.microsoft.com/office/powerpoint/2010/main" val="2114301515"/>
               </p:ext>
             </p:extLst>
           </p:nvPr>
         </p:nvGraphicFramePr>
         <p:xfrm>
-          <a:off x="1095052" y="2401771"/>
-          <a:ext cx="10001896" cy="4116620"/>
+          <a:off x="1290341" y="2283555"/>
+          <a:ext cx="9611316" cy="4513091"/>
         </p:xfrm>
         <a:graphic>
           <a:graphicData uri="http://schemas.openxmlformats.org/drawingml/2006/table">
@@ -5878,36 +5878,22 @@
                 <a:tableStyleId>{5C22544A-7EE6-4342-B048-85BDC9FD1C3A}</a:tableStyleId>
               </a:tblPr>
               <a:tblGrid>
-                <a:gridCol w="2500474">
+                <a:gridCol w="4805658">
                   <a:extLst>
                     <a:ext uri="{9D8B030D-6E8A-4147-A177-3AD203B41FA5}">
                       <a16:colId xmlns:a16="http://schemas.microsoft.com/office/drawing/2014/main" val="1001166575"/>
                     </a:ext>
                   </a:extLst>
                 </a:gridCol>
-                <a:gridCol w="2500474">
+                <a:gridCol w="4805658">
                   <a:extLst>
                     <a:ext uri="{9D8B030D-6E8A-4147-A177-3AD203B41FA5}">
                       <a16:colId xmlns:a16="http://schemas.microsoft.com/office/drawing/2014/main" val="744982262"/>
                     </a:ext>
                   </a:extLst>
                 </a:gridCol>
-                <a:gridCol w="2500474">
-                  <a:extLst>
-                    <a:ext uri="{9D8B030D-6E8A-4147-A177-3AD203B41FA5}">
-                      <a16:colId xmlns:a16="http://schemas.microsoft.com/office/drawing/2014/main" val="1764939123"/>
-                    </a:ext>
-                  </a:extLst>
-                </a:gridCol>
-                <a:gridCol w="2500474">
-                  <a:extLst>
-                    <a:ext uri="{9D8B030D-6E8A-4147-A177-3AD203B41FA5}">
-                      <a16:colId xmlns:a16="http://schemas.microsoft.com/office/drawing/2014/main" val="2383612702"/>
-                    </a:ext>
-                  </a:extLst>
-                </a:gridCol>
               </a:tblGrid>
-              <a:tr h="411662">
+              <a:tr h="410281">
                 <a:tc>
                   <a:txBody>
                     <a:bodyPr/>
@@ -5934,65 +5920,19 @@
                   </a:txBody>
                   <a:tcPr/>
                 </a:tc>
-                <a:tc>
-                  <a:txBody>
-                    <a:bodyPr/>
-                    <a:lstStyle/>
-                    <a:p>
-                      <a:r>
-                        <a:rPr lang="en-US" dirty="0"/>
-                        <a:t>Least Used</a:t>
-                      </a:r>
-                    </a:p>
-                  </a:txBody>
-                  <a:tcPr/>
-                </a:tc>
-                <a:tc>
-                  <a:txBody>
-                    <a:bodyPr/>
-                    <a:lstStyle/>
-                    <a:p>
-                      <a:r>
-                        <a:rPr lang="en-US" dirty="0"/>
-                        <a:t>Frequency</a:t>
-                      </a:r>
-                    </a:p>
-                  </a:txBody>
-                  <a:tcPr/>
-                </a:tc>
                 <a:extLst>
                   <a:ext uri="{0D108BD9-81ED-4DB2-BD59-A6C34878D82A}">
                     <a16:rowId xmlns:a16="http://schemas.microsoft.com/office/drawing/2014/main" val="470056214"/>
                   </a:ext>
                 </a:extLst>
               </a:tr>
-              <a:tr h="411662">
+              <a:tr h="410281">
                 <a:tc>
                   <a:txBody>
                     <a:bodyPr/>
                     <a:lstStyle/>
                     <a:p>
-                      <a:endParaRPr lang="en-US"/>
-                    </a:p>
-                  </a:txBody>
-                  <a:tcPr/>
-                </a:tc>
-                <a:tc>
-                  <a:txBody>
-                    <a:bodyPr/>
-                    <a:lstStyle/>
-                    <a:p>
-                      <a:endParaRPr lang="en-US"/>
-                    </a:p>
-                  </a:txBody>
-                  <a:tcPr/>
-                </a:tc>
-                <a:tc>
-                  <a:txBody>
-                    <a:bodyPr/>
-                    <a:lstStyle/>
-                    <a:p>
-                      <a:endParaRPr lang="en-US"/>
+                      <a:endParaRPr lang="en-US" dirty="0"/>
                     </a:p>
                   </a:txBody>
                   <a:tcPr/>
@@ -6013,13 +5953,13 @@
                   </a:ext>
                 </a:extLst>
               </a:tr>
-              <a:tr h="411662">
+              <a:tr h="410281">
                 <a:tc>
                   <a:txBody>
                     <a:bodyPr/>
                     <a:lstStyle/>
                     <a:p>
-                      <a:endParaRPr lang="en-US"/>
+                      <a:endParaRPr lang="en-US" dirty="0"/>
                     </a:p>
                   </a:txBody>
                   <a:tcPr/>
@@ -6029,11 +5969,18 @@
                     <a:bodyPr/>
                     <a:lstStyle/>
                     <a:p>
-                      <a:endParaRPr lang="en-US"/>
+                      <a:endParaRPr lang="en-US" dirty="0"/>
                     </a:p>
                   </a:txBody>
                   <a:tcPr/>
                 </a:tc>
+                <a:extLst>
+                  <a:ext uri="{0D108BD9-81ED-4DB2-BD59-A6C34878D82A}">
+                    <a16:rowId xmlns:a16="http://schemas.microsoft.com/office/drawing/2014/main" val="3949766810"/>
+                  </a:ext>
+                </a:extLst>
+              </a:tr>
+              <a:tr h="410281">
                 <a:tc>
                   <a:txBody>
                     <a:bodyPr/>
@@ -6060,27 +6007,7 @@
                   </a:ext>
                 </a:extLst>
               </a:tr>
-              <a:tr h="411662">
-                <a:tc>
-                  <a:txBody>
-                    <a:bodyPr/>
-                    <a:lstStyle/>
-                    <a:p>
-                      <a:endParaRPr lang="en-US"/>
-                    </a:p>
-                  </a:txBody>
-                  <a:tcPr/>
-                </a:tc>
-                <a:tc>
-                  <a:txBody>
-                    <a:bodyPr/>
-                    <a:lstStyle/>
-                    <a:p>
-                      <a:endParaRPr lang="en-US"/>
-                    </a:p>
-                  </a:txBody>
-                  <a:tcPr/>
-                </a:tc>
+              <a:tr h="410281">
                 <a:tc>
                   <a:txBody>
                     <a:bodyPr/>
@@ -6107,7 +6034,7 @@
                   </a:ext>
                 </a:extLst>
               </a:tr>
-              <a:tr h="411662">
+              <a:tr h="410281">
                 <a:tc>
                   <a:txBody>
                     <a:bodyPr/>
@@ -6123,11 +6050,18 @@
                     <a:bodyPr/>
                     <a:lstStyle/>
                     <a:p>
-                      <a:endParaRPr lang="en-US"/>
+                      <a:endParaRPr lang="en-US" dirty="0"/>
                     </a:p>
                   </a:txBody>
                   <a:tcPr/>
                 </a:tc>
+                <a:extLst>
+                  <a:ext uri="{0D108BD9-81ED-4DB2-BD59-A6C34878D82A}">
+                    <a16:rowId xmlns:a16="http://schemas.microsoft.com/office/drawing/2014/main" val="4218159937"/>
+                  </a:ext>
+                </a:extLst>
+              </a:tr>
+              <a:tr h="410281">
                 <a:tc>
                   <a:txBody>
                     <a:bodyPr/>
@@ -6143,54 +6077,7 @@
                     <a:bodyPr/>
                     <a:lstStyle/>
                     <a:p>
-                      <a:endParaRPr lang="en-US"/>
-                    </a:p>
-                  </a:txBody>
-                  <a:tcPr/>
-                </a:tc>
-                <a:extLst>
-                  <a:ext uri="{0D108BD9-81ED-4DB2-BD59-A6C34878D82A}">
-                    <a16:rowId xmlns:a16="http://schemas.microsoft.com/office/drawing/2014/main" val="4218159937"/>
-                  </a:ext>
-                </a:extLst>
-              </a:tr>
-              <a:tr h="411662">
-                <a:tc>
-                  <a:txBody>
-                    <a:bodyPr/>
-                    <a:lstStyle/>
-                    <a:p>
-                      <a:endParaRPr lang="en-US"/>
-                    </a:p>
-                  </a:txBody>
-                  <a:tcPr/>
-                </a:tc>
-                <a:tc>
-                  <a:txBody>
-                    <a:bodyPr/>
-                    <a:lstStyle/>
-                    <a:p>
-                      <a:endParaRPr lang="en-US"/>
-                    </a:p>
-                  </a:txBody>
-                  <a:tcPr/>
-                </a:tc>
-                <a:tc>
-                  <a:txBody>
-                    <a:bodyPr/>
-                    <a:lstStyle/>
-                    <a:p>
-                      <a:endParaRPr lang="en-US"/>
-                    </a:p>
-                  </a:txBody>
-                  <a:tcPr/>
-                </a:tc>
-                <a:tc>
-                  <a:txBody>
-                    <a:bodyPr/>
-                    <a:lstStyle/>
-                    <a:p>
-                      <a:endParaRPr lang="en-US"/>
+                      <a:endParaRPr lang="en-US" dirty="0"/>
                     </a:p>
                   </a:txBody>
                   <a:tcPr/>
@@ -6201,27 +6088,7 @@
                   </a:ext>
                 </a:extLst>
               </a:tr>
-              <a:tr h="411662">
-                <a:tc>
-                  <a:txBody>
-                    <a:bodyPr/>
-                    <a:lstStyle/>
-                    <a:p>
-                      <a:endParaRPr lang="en-US"/>
-                    </a:p>
-                  </a:txBody>
-                  <a:tcPr/>
-                </a:tc>
-                <a:tc>
-                  <a:txBody>
-                    <a:bodyPr/>
-                    <a:lstStyle/>
-                    <a:p>
-                      <a:endParaRPr lang="en-US"/>
-                    </a:p>
-                  </a:txBody>
-                  <a:tcPr/>
-                </a:tc>
+              <a:tr h="410281">
                 <a:tc>
                   <a:txBody>
                     <a:bodyPr/>
@@ -6248,27 +6115,7 @@
                   </a:ext>
                 </a:extLst>
               </a:tr>
-              <a:tr h="411662">
-                <a:tc>
-                  <a:txBody>
-                    <a:bodyPr/>
-                    <a:lstStyle/>
-                    <a:p>
-                      <a:endParaRPr lang="en-US"/>
-                    </a:p>
-                  </a:txBody>
-                  <a:tcPr/>
-                </a:tc>
-                <a:tc>
-                  <a:txBody>
-                    <a:bodyPr/>
-                    <a:lstStyle/>
-                    <a:p>
-                      <a:endParaRPr lang="en-US"/>
-                    </a:p>
-                  </a:txBody>
-                  <a:tcPr/>
-                </a:tc>
+              <a:tr h="410281">
                 <a:tc>
                   <a:txBody>
                     <a:bodyPr/>
@@ -6295,27 +6142,7 @@
                   </a:ext>
                 </a:extLst>
               </a:tr>
-              <a:tr h="411662">
-                <a:tc>
-                  <a:txBody>
-                    <a:bodyPr/>
-                    <a:lstStyle/>
-                    <a:p>
-                      <a:endParaRPr lang="en-US"/>
-                    </a:p>
-                  </a:txBody>
-                  <a:tcPr/>
-                </a:tc>
-                <a:tc>
-                  <a:txBody>
-                    <a:bodyPr/>
-                    <a:lstStyle/>
-                    <a:p>
-                      <a:endParaRPr lang="en-US"/>
-                    </a:p>
-                  </a:txBody>
-                  <a:tcPr/>
-                </a:tc>
+              <a:tr h="410281">
                 <a:tc>
                   <a:txBody>
                     <a:bodyPr/>
@@ -6342,33 +6169,13 @@
                   </a:ext>
                 </a:extLst>
               </a:tr>
-              <a:tr h="411662">
+              <a:tr h="410281">
                 <a:tc>
                   <a:txBody>
                     <a:bodyPr/>
                     <a:lstStyle/>
                     <a:p>
-                      <a:endParaRPr lang="en-US"/>
-                    </a:p>
-                  </a:txBody>
-                  <a:tcPr/>
-                </a:tc>
-                <a:tc>
-                  <a:txBody>
-                    <a:bodyPr/>
-                    <a:lstStyle/>
-                    <a:p>
-                      <a:endParaRPr lang="en-US"/>
-                    </a:p>
-                  </a:txBody>
-                  <a:tcPr/>
-                </a:tc>
-                <a:tc>
-                  <a:txBody>
-                    <a:bodyPr/>
-                    <a:lstStyle/>
-                    <a:p>
-                      <a:endParaRPr lang="en-US"/>
+                      <a:endParaRPr lang="en-US" dirty="0"/>
                     </a:p>
                   </a:txBody>
                   <a:tcPr/>

</xml_diff>